<commit_message>
added code to mongo part 2 ppt
</commit_message>
<xml_diff>
--- a/tirgul/MongoDB – part 2.pptx
+++ b/tirgul/MongoDB – part 2.pptx
@@ -116,6 +116,11 @@
       </a:defRPr>
     </a:lvl9pPr>
   </p:defaultTextStyle>
+  <p:extLst>
+    <p:ext uri="{EFAFB233-063F-42B5-8137-9DF3F51BA10A}">
+      <p15:sldGuideLst xmlns:p15="http://schemas.microsoft.com/office/powerpoint/2012/main"/>
+    </p:ext>
+  </p:extLst>
 </p:presentation>
 </file>
 
@@ -4033,6 +4038,13 @@
   <p:clrMapOvr>
     <a:masterClrMapping/>
   </p:clrMapOvr>
+  <p:timing>
+    <p:tnLst>
+      <p:par>
+        <p:cTn id="1" dur="indefinite" restart="never" nodeType="tmRoot"/>
+      </p:par>
+    </p:tnLst>
+  </p:timing>
 </p:sld>
 </file>
 
@@ -4192,6 +4204,13 @@
   <p:clrMapOvr>
     <a:masterClrMapping/>
   </p:clrMapOvr>
+  <p:timing>
+    <p:tnLst>
+      <p:par>
+        <p:cTn id="1" dur="indefinite" restart="never" nodeType="tmRoot"/>
+      </p:par>
+    </p:tnLst>
+  </p:timing>
 </p:sld>
 </file>
 
@@ -4292,6 +4311,13 @@
   <p:clrMapOvr>
     <a:masterClrMapping/>
   </p:clrMapOvr>
+  <p:timing>
+    <p:tnLst>
+      <p:par>
+        <p:cTn id="1" dur="indefinite" restart="never" nodeType="tmRoot"/>
+      </p:par>
+    </p:tnLst>
+  </p:timing>
 </p:sld>
 </file>
 
@@ -4455,10 +4481,6 @@
               <a:rPr lang="en-US" sz="1200" dirty="0"/>
               <a:t>); </a:t>
             </a:r>
-            <a:r>
-              <a:rPr lang="en-US" sz="1200" dirty="0"/>
-              <a:t/>
-            </a:r>
             <a:br>
               <a:rPr lang="en-US" sz="1200" dirty="0"/>
             </a:br>
@@ -4758,6 +4780,13 @@
   <p:clrMapOvr>
     <a:masterClrMapping/>
   </p:clrMapOvr>
+  <p:timing>
+    <p:tnLst>
+      <p:par>
+        <p:cTn id="1" dur="indefinite" restart="never" nodeType="tmRoot"/>
+      </p:par>
+    </p:tnLst>
+  </p:timing>
 </p:sld>
 </file>
 
@@ -4979,6 +5008,13 @@
   <p:clrMapOvr>
     <a:masterClrMapping/>
   </p:clrMapOvr>
+  <p:timing>
+    <p:tnLst>
+      <p:par>
+        <p:cTn id="1" dur="indefinite" restart="never" nodeType="tmRoot"/>
+      </p:par>
+    </p:tnLst>
+  </p:timing>
 </p:sld>
 </file>
 
@@ -5098,6 +5134,13 @@
   <p:clrMapOvr>
     <a:masterClrMapping/>
   </p:clrMapOvr>
+  <p:timing>
+    <p:tnLst>
+      <p:par>
+        <p:cTn id="1" dur="indefinite" restart="never" nodeType="tmRoot"/>
+      </p:par>
+    </p:tnLst>
+  </p:timing>
 </p:sld>
 </file>
 
@@ -5221,6 +5264,13 @@
   <p:clrMapOvr>
     <a:masterClrMapping/>
   </p:clrMapOvr>
+  <p:timing>
+    <p:tnLst>
+      <p:par>
+        <p:cTn id="1" dur="indefinite" restart="never" nodeType="tmRoot"/>
+      </p:par>
+    </p:tnLst>
+  </p:timing>
 </p:sld>
 </file>
 
@@ -5359,10 +5409,6 @@
               <a:rPr lang="en-US" dirty="0"/>
               <a:t>://localhost/test'); </a:t>
             </a:r>
-            <a:r>
-              <a:rPr lang="en-US" dirty="0"/>
-              <a:t/>
-            </a:r>
             <a:br>
               <a:rPr lang="en-US" dirty="0"/>
             </a:br>
@@ -5410,6 +5456,13 @@
   <p:clrMapOvr>
     <a:masterClrMapping/>
   </p:clrMapOvr>
+  <p:timing>
+    <p:tnLst>
+      <p:par>
+        <p:cTn id="1" dur="indefinite" restart="never" nodeType="tmRoot"/>
+      </p:par>
+    </p:tnLst>
+  </p:timing>
 </p:sld>
 </file>
 
@@ -5744,6 +5797,13 @@
   <p:clrMapOvr>
     <a:masterClrMapping/>
   </p:clrMapOvr>
+  <p:timing>
+    <p:tnLst>
+      <p:par>
+        <p:cTn id="1" dur="indefinite" restart="never" nodeType="tmRoot"/>
+      </p:par>
+    </p:tnLst>
+  </p:timing>
 </p:sld>
 </file>
 
@@ -5815,63 +5875,63 @@
           </a:p>
           <a:p>
             <a:r>
-              <a:rPr lang="he-IL" dirty="0" smtClean="0"/>
+              <a:rPr lang="he-IL" sz="1600" dirty="0" smtClean="0"/>
               <a:t>המקבילה לחיפוש </a:t>
             </a:r>
             <a:r>
-              <a:rPr lang="he-IL" dirty="0" err="1" smtClean="0"/>
+              <a:rPr lang="he-IL" sz="1600" dirty="0" err="1" smtClean="0"/>
               <a:t>במונגו</a:t>
             </a:r>
             <a:r>
-              <a:rPr lang="he-IL" dirty="0" smtClean="0"/>
+              <a:rPr lang="he-IL" sz="1600" dirty="0" smtClean="0"/>
               <a:t> שראינו.</a:t>
             </a:r>
           </a:p>
           <a:p>
             <a:r>
-              <a:rPr lang="he-IL" dirty="0" smtClean="0"/>
+              <a:rPr lang="he-IL" sz="1600" dirty="0" smtClean="0"/>
               <a:t>מקבלת אובייקט תנאים – </a:t>
             </a:r>
             <a:r>
-              <a:rPr lang="en-US" dirty="0" smtClean="0"/>
+              <a:rPr lang="en-US" sz="1600" dirty="0" smtClean="0"/>
               <a:t>conditions</a:t>
             </a:r>
-            <a:endParaRPr lang="he-IL" dirty="0" smtClean="0"/>
-          </a:p>
-          <a:p>
-            <a:r>
-              <a:rPr lang="he-IL" dirty="0" smtClean="0"/>
+            <a:endParaRPr lang="he-IL" sz="1600" dirty="0" smtClean="0"/>
+          </a:p>
+          <a:p>
+            <a:r>
+              <a:rPr lang="he-IL" sz="1600" dirty="0" smtClean="0"/>
               <a:t>מקבלת אובייקט החזרה - </a:t>
             </a:r>
             <a:r>
-              <a:rPr lang="en-US" dirty="0" smtClean="0"/>
+              <a:rPr lang="en-US" sz="1600" dirty="0" smtClean="0"/>
               <a:t>projection</a:t>
             </a:r>
           </a:p>
           <a:p>
             <a:r>
-              <a:rPr lang="he-IL" dirty="0" smtClean="0"/>
+              <a:rPr lang="he-IL" sz="1600" dirty="0" smtClean="0"/>
               <a:t>מקבלת אובייקט אפשרויות נוספות</a:t>
             </a:r>
           </a:p>
           <a:p>
             <a:r>
-              <a:rPr lang="he-IL" dirty="0" smtClean="0"/>
+              <a:rPr lang="he-IL" sz="1600" dirty="0" smtClean="0"/>
               <a:t>מקבלת פונקציית </a:t>
             </a:r>
             <a:r>
-              <a:rPr lang="en-US" dirty="0" smtClean="0"/>
+              <a:rPr lang="en-US" sz="1600" dirty="0" smtClean="0"/>
               <a:t>callback</a:t>
             </a:r>
             <a:r>
-              <a:rPr lang="he-IL" dirty="0" smtClean="0"/>
+              <a:rPr lang="he-IL" sz="1600" dirty="0" smtClean="0"/>
               <a:t> להתמודדות עם הצלחה או </a:t>
             </a:r>
             <a:r>
-              <a:rPr lang="he-IL" dirty="0" err="1" smtClean="0"/>
+              <a:rPr lang="he-IL" sz="1600" dirty="0" err="1" smtClean="0"/>
               <a:t>כשלון</a:t>
             </a:r>
-            <a:endParaRPr lang="he-IL" dirty="0" smtClean="0"/>
+            <a:endParaRPr lang="he-IL" sz="1600" dirty="0" smtClean="0"/>
           </a:p>
           <a:p>
             <a:pPr marL="0" indent="0">
@@ -5928,6 +5988,198 @@
           </a:p>
         </p:txBody>
       </p:sp>
+      <p:sp>
+        <p:nvSpPr>
+          <p:cNvPr id="4" name="TextBox 3"/>
+          <p:cNvSpPr txBox="1"/>
+          <p:nvPr/>
+        </p:nvSpPr>
+        <p:spPr>
+          <a:xfrm>
+            <a:off x="0" y="3583444"/>
+            <a:ext cx="6051665" cy="2677656"/>
+          </a:xfrm>
+          <a:prstGeom prst="rect">
+            <a:avLst/>
+          </a:prstGeom>
+          <a:noFill/>
+        </p:spPr>
+        <p:txBody>
+          <a:bodyPr wrap="square" rtlCol="1">
+            <a:spAutoFit/>
+          </a:bodyPr>
+          <a:lstStyle/>
+          <a:p>
+            <a:r>
+              <a:rPr lang="en-US" sz="1400" dirty="0"/>
+              <a:t>// named john and at least 18</a:t>
+            </a:r>
+          </a:p>
+          <a:p>
+            <a:r>
+              <a:rPr lang="en-US" sz="1400" dirty="0" err="1">
+                <a:solidFill>
+                  <a:srgbClr val="0070C0"/>
+                </a:solidFill>
+              </a:rPr>
+              <a:t>MyModel.find</a:t>
+            </a:r>
+            <a:r>
+              <a:rPr lang="en-US" sz="1400" dirty="0">
+                <a:solidFill>
+                  <a:srgbClr val="0070C0"/>
+                </a:solidFill>
+              </a:rPr>
+              <a:t>({ name: 'john', age: { $</a:t>
+            </a:r>
+            <a:r>
+              <a:rPr lang="en-US" sz="1400" dirty="0" err="1">
+                <a:solidFill>
+                  <a:srgbClr val="0070C0"/>
+                </a:solidFill>
+              </a:rPr>
+              <a:t>gte</a:t>
+            </a:r>
+            <a:r>
+              <a:rPr lang="en-US" sz="1400" dirty="0">
+                <a:solidFill>
+                  <a:srgbClr val="0070C0"/>
+                </a:solidFill>
+              </a:rPr>
+              <a:t>: 18 }});</a:t>
+            </a:r>
+          </a:p>
+          <a:p>
+            <a:endParaRPr lang="en-US" sz="1400" dirty="0"/>
+          </a:p>
+          <a:p>
+            <a:r>
+              <a:rPr lang="en-US" sz="1400" dirty="0"/>
+              <a:t>// executes immediately, passing results to callback</a:t>
+            </a:r>
+          </a:p>
+          <a:p>
+            <a:r>
+              <a:rPr lang="en-US" sz="1400" dirty="0" err="1">
+                <a:solidFill>
+                  <a:srgbClr val="0070C0"/>
+                </a:solidFill>
+              </a:rPr>
+              <a:t>MyModel.find</a:t>
+            </a:r>
+            <a:r>
+              <a:rPr lang="en-US" sz="1400" dirty="0">
+                <a:solidFill>
+                  <a:srgbClr val="0070C0"/>
+                </a:solidFill>
+              </a:rPr>
+              <a:t>({ name: 'john', age: { $</a:t>
+            </a:r>
+            <a:r>
+              <a:rPr lang="en-US" sz="1400" dirty="0" err="1">
+                <a:solidFill>
+                  <a:srgbClr val="0070C0"/>
+                </a:solidFill>
+              </a:rPr>
+              <a:t>gte</a:t>
+            </a:r>
+            <a:r>
+              <a:rPr lang="en-US" sz="1400" dirty="0">
+                <a:solidFill>
+                  <a:srgbClr val="0070C0"/>
+                </a:solidFill>
+              </a:rPr>
+              <a:t>: 18 }}, function (err, docs) {});</a:t>
+            </a:r>
+          </a:p>
+          <a:p>
+            <a:endParaRPr lang="en-US" sz="1400" dirty="0"/>
+          </a:p>
+          <a:p>
+            <a:r>
+              <a:rPr lang="en-US" sz="1400" dirty="0"/>
+              <a:t>// name LIKE john and only selecting the "name" and "friends" fields, executing immediately</a:t>
+            </a:r>
+          </a:p>
+          <a:p>
+            <a:r>
+              <a:rPr lang="en-US" sz="1400" dirty="0" err="1">
+                <a:solidFill>
+                  <a:srgbClr val="0070C0"/>
+                </a:solidFill>
+              </a:rPr>
+              <a:t>MyModel.find</a:t>
+            </a:r>
+            <a:r>
+              <a:rPr lang="en-US" sz="1400" dirty="0">
+                <a:solidFill>
+                  <a:srgbClr val="0070C0"/>
+                </a:solidFill>
+              </a:rPr>
+              <a:t>({ name: /john/</a:t>
+            </a:r>
+            <a:r>
+              <a:rPr lang="en-US" sz="1400" dirty="0" err="1">
+                <a:solidFill>
+                  <a:srgbClr val="0070C0"/>
+                </a:solidFill>
+              </a:rPr>
+              <a:t>i</a:t>
+            </a:r>
+            <a:r>
+              <a:rPr lang="en-US" sz="1400" dirty="0">
+                <a:solidFill>
+                  <a:srgbClr val="0070C0"/>
+                </a:solidFill>
+              </a:rPr>
+              <a:t> }, 'name friends', function (err, docs) { })</a:t>
+            </a:r>
+          </a:p>
+          <a:p>
+            <a:endParaRPr lang="en-US" sz="1400" dirty="0"/>
+          </a:p>
+          <a:p>
+            <a:r>
+              <a:rPr lang="en-US" sz="1400" dirty="0"/>
+              <a:t>// passing options</a:t>
+            </a:r>
+          </a:p>
+          <a:p>
+            <a:r>
+              <a:rPr lang="en-US" sz="1400" dirty="0" err="1">
+                <a:solidFill>
+                  <a:srgbClr val="0070C0"/>
+                </a:solidFill>
+              </a:rPr>
+              <a:t>MyModel.find</a:t>
+            </a:r>
+            <a:r>
+              <a:rPr lang="en-US" sz="1400" dirty="0">
+                <a:solidFill>
+                  <a:srgbClr val="0070C0"/>
+                </a:solidFill>
+              </a:rPr>
+              <a:t>({ name: /john/</a:t>
+            </a:r>
+            <a:r>
+              <a:rPr lang="en-US" sz="1400" dirty="0" err="1">
+                <a:solidFill>
+                  <a:srgbClr val="0070C0"/>
+                </a:solidFill>
+              </a:rPr>
+              <a:t>i</a:t>
+            </a:r>
+            <a:r>
+              <a:rPr lang="en-US" sz="1400" dirty="0">
+                <a:solidFill>
+                  <a:srgbClr val="0070C0"/>
+                </a:solidFill>
+              </a:rPr>
+              <a:t> }, null, { skip: 10 })</a:t>
+            </a:r>
+          </a:p>
+        </p:txBody>
+      </p:sp>
     </p:spTree>
     <p:extLst>
       <p:ext uri="{BB962C8B-B14F-4D97-AF65-F5344CB8AC3E}">
@@ -5938,6 +6190,13 @@
   <p:clrMapOvr>
     <a:masterClrMapping/>
   </p:clrMapOvr>
+  <p:timing>
+    <p:tnLst>
+      <p:par>
+        <p:cTn id="1" dur="indefinite" restart="never" nodeType="tmRoot"/>
+      </p:par>
+    </p:tnLst>
+  </p:timing>
 </p:sld>
 </file>
 
@@ -6180,6 +6439,13 @@
   <p:clrMapOvr>
     <a:masterClrMapping/>
   </p:clrMapOvr>
+  <p:timing>
+    <p:tnLst>
+      <p:par>
+        <p:cTn id="1" dur="indefinite" restart="never" nodeType="tmRoot"/>
+      </p:par>
+    </p:tnLst>
+  </p:timing>
 </p:sld>
 </file>
 
@@ -6501,6 +6767,13 @@
   <p:clrMapOvr>
     <a:masterClrMapping/>
   </p:clrMapOvr>
+  <p:timing>
+    <p:tnLst>
+      <p:par>
+        <p:cTn id="1" dur="indefinite" restart="never" nodeType="tmRoot"/>
+      </p:par>
+    </p:tnLst>
+  </p:timing>
 </p:sld>
 </file>
 
@@ -6763,6 +7036,13 @@
   <p:clrMapOvr>
     <a:masterClrMapping/>
   </p:clrMapOvr>
+  <p:timing>
+    <p:tnLst>
+      <p:par>
+        <p:cTn id="1" dur="indefinite" restart="never" nodeType="tmRoot"/>
+      </p:par>
+    </p:tnLst>
+  </p:timing>
 </p:sld>
 </file>
 

</xml_diff>